<commit_message>
I'm using a translator. Your English is really good. I've edited the Excel file and made other miscellaneous changes. I'm uploading this while I'm at it, since I just installed Fork.
</commit_message>
<xml_diff>
--- a/1대1 프로젝트/전투 시스템 기획서.pptx
+++ b/1대1 프로젝트/전투 시스템 기획서.pptx
@@ -4481,14 +4481,6 @@
                 </a:rPr>
                 <a:t>내구도 표시</a:t>
               </a:r>
-              <a:endParaRPr lang="ko-KR" altLang="en-US">
-                <a:solidFill>
-                  <a:schemeClr val="tx1"/>
-                </a:solidFill>
-                <a:latin typeface="Pretendard" panose="02000503000000020004" pitchFamily="50" charset="-127"/>
-                <a:ea typeface="Pretendard" panose="02000503000000020004" pitchFamily="50" charset="-127"/>
-                <a:cs typeface="Pretendard" panose="02000503000000020004" pitchFamily="50" charset="-127"/>
-              </a:endParaRPr>
             </a:p>
           </p:txBody>
         </p:sp>
@@ -4779,14 +4771,6 @@
                 </a:rPr>
                 <a:t>내구도 표시</a:t>
               </a:r>
-              <a:endParaRPr lang="ko-KR" altLang="en-US">
-                <a:solidFill>
-                  <a:schemeClr val="tx1"/>
-                </a:solidFill>
-                <a:latin typeface="Pretendard" panose="02000503000000020004" pitchFamily="50" charset="-127"/>
-                <a:ea typeface="Pretendard" panose="02000503000000020004" pitchFamily="50" charset="-127"/>
-                <a:cs typeface="Pretendard" panose="02000503000000020004" pitchFamily="50" charset="-127"/>
-              </a:endParaRPr>
             </a:p>
           </p:txBody>
         </p:sp>
@@ -5946,14 +5930,6 @@
                 </a:rPr>
                 <a:t>내구도 표시</a:t>
               </a:r>
-              <a:endParaRPr lang="ko-KR" altLang="en-US">
-                <a:solidFill>
-                  <a:schemeClr val="tx1"/>
-                </a:solidFill>
-                <a:latin typeface="Pretendard" panose="02000503000000020004" pitchFamily="50" charset="-127"/>
-                <a:ea typeface="Pretendard" panose="02000503000000020004" pitchFamily="50" charset="-127"/>
-                <a:cs typeface="Pretendard" panose="02000503000000020004" pitchFamily="50" charset="-127"/>
-              </a:endParaRPr>
             </a:p>
           </p:txBody>
         </p:sp>
@@ -6244,14 +6220,6 @@
                 </a:rPr>
                 <a:t>내구도 표시</a:t>
               </a:r>
-              <a:endParaRPr lang="ko-KR" altLang="en-US">
-                <a:solidFill>
-                  <a:schemeClr val="tx1"/>
-                </a:solidFill>
-                <a:latin typeface="Pretendard" panose="02000503000000020004" pitchFamily="50" charset="-127"/>
-                <a:ea typeface="Pretendard" panose="02000503000000020004" pitchFamily="50" charset="-127"/>
-                <a:cs typeface="Pretendard" panose="02000503000000020004" pitchFamily="50" charset="-127"/>
-              </a:endParaRPr>
             </a:p>
           </p:txBody>
         </p:sp>
@@ -7387,14 +7355,6 @@
                 </a:rPr>
                 <a:t>내구도 표시</a:t>
               </a:r>
-              <a:endParaRPr lang="ko-KR" altLang="en-US" sz="800">
-                <a:solidFill>
-                  <a:schemeClr val="tx1"/>
-                </a:solidFill>
-                <a:latin typeface="Pretendard" panose="02000503000000020004" pitchFamily="50" charset="-127"/>
-                <a:ea typeface="Pretendard" panose="02000503000000020004" pitchFamily="50" charset="-127"/>
-                <a:cs typeface="Pretendard" panose="02000503000000020004" pitchFamily="50" charset="-127"/>
-              </a:endParaRPr>
             </a:p>
           </p:txBody>
         </p:sp>
@@ -7685,14 +7645,6 @@
                 </a:rPr>
                 <a:t>내구도 표시</a:t>
               </a:r>
-              <a:endParaRPr lang="ko-KR" altLang="en-US" sz="800">
-                <a:solidFill>
-                  <a:schemeClr val="tx1"/>
-                </a:solidFill>
-                <a:latin typeface="Pretendard" panose="02000503000000020004" pitchFamily="50" charset="-127"/>
-                <a:ea typeface="Pretendard" panose="02000503000000020004" pitchFamily="50" charset="-127"/>
-                <a:cs typeface="Pretendard" panose="02000503000000020004" pitchFamily="50" charset="-127"/>
-              </a:endParaRPr>
             </a:p>
           </p:txBody>
         </p:sp>
@@ -8915,14 +8867,6 @@
                 </a:rPr>
                 <a:t>내구도 표시</a:t>
               </a:r>
-              <a:endParaRPr lang="ko-KR" altLang="en-US" sz="800">
-                <a:solidFill>
-                  <a:schemeClr val="tx1"/>
-                </a:solidFill>
-                <a:latin typeface="Pretendard" panose="02000503000000020004" pitchFamily="50" charset="-127"/>
-                <a:ea typeface="Pretendard" panose="02000503000000020004" pitchFamily="50" charset="-127"/>
-                <a:cs typeface="Pretendard" panose="02000503000000020004" pitchFamily="50" charset="-127"/>
-              </a:endParaRPr>
             </a:p>
           </p:txBody>
         </p:sp>
@@ -9213,14 +9157,6 @@
                 </a:rPr>
                 <a:t>내구도 표시</a:t>
               </a:r>
-              <a:endParaRPr lang="ko-KR" altLang="en-US" sz="800">
-                <a:solidFill>
-                  <a:schemeClr val="tx1"/>
-                </a:solidFill>
-                <a:latin typeface="Pretendard" panose="02000503000000020004" pitchFamily="50" charset="-127"/>
-                <a:ea typeface="Pretendard" panose="02000503000000020004" pitchFamily="50" charset="-127"/>
-                <a:cs typeface="Pretendard" panose="02000503000000020004" pitchFamily="50" charset="-127"/>
-              </a:endParaRPr>
             </a:p>
           </p:txBody>
         </p:sp>
@@ -18565,11 +18501,7 @@
             </a:pPr>
             <a:r>
               <a:rPr lang="ko-KR" altLang="en-US" smtClean="0"/>
-              <a:t>보스</a:t>
-            </a:r>
-            <a:r>
-              <a:rPr lang="ko-KR" altLang="en-US" smtClean="0"/>
-              <a:t> 스텟 테이블</a:t>
+              <a:t>보스 스텟 테이블</a:t>
             </a:r>
             <a:endParaRPr/>
           </a:p>

</xml_diff>